<commit_message>
slides14m,w; typos in ruin recurrences; deviation section label
</commit_message>
<xml_diff>
--- a/fall11/slidesF11/slides14m.pptx
+++ b/fall11/slidesF11/slides14m.pptx
@@ -5111,11 +5111,7 @@
             </a:r>
             <a:r>
               <a:rPr lang="en-US" dirty="0" smtClean="0"/>
-              <a:t> </a:t>
-            </a:r>
-            <a:r>
-              <a:rPr lang="en-US" dirty="0" smtClean="0"/>
-              <a:t>14M.</a:t>
+              <a:t> 14M.</a:t>
             </a:r>
             <a:fld id="{FC9265C7-2444-489D-860F-86AAC4235083}" type="slidenum">
               <a:rPr lang="en-US" smtClean="0"/>
@@ -5287,11 +5283,7 @@
             </a:r>
             <a:r>
               <a:rPr lang="en-US" dirty="0" smtClean="0"/>
-              <a:t> </a:t>
-            </a:r>
-            <a:r>
-              <a:rPr lang="en-US" dirty="0" smtClean="0"/>
-              <a:t>14M.</a:t>
+              <a:t> 14M.</a:t>
             </a:r>
             <a:fld id="{7886A709-CED2-48A3-8616-B2655C008ECB}" type="slidenum">
               <a:rPr lang="en-US" smtClean="0"/>
@@ -5454,11 +5446,7 @@
             </a:r>
             <a:r>
               <a:rPr lang="en-US" dirty="0" smtClean="0"/>
-              <a:t> </a:t>
-            </a:r>
-            <a:r>
-              <a:rPr lang="en-US" dirty="0" smtClean="0"/>
-              <a:t>14M.</a:t>
+              <a:t> 14M.</a:t>
             </a:r>
             <a:fld id="{BF80F45E-FB96-45E0-92FC-8BB2C6497030}" type="slidenum">
               <a:rPr lang="en-US" smtClean="0"/>
@@ -5551,11 +5539,7 @@
             </a:r>
             <a:r>
               <a:rPr lang="en-US" dirty="0" smtClean="0"/>
-              <a:t> </a:t>
-            </a:r>
-            <a:r>
-              <a:rPr lang="en-US" dirty="0" smtClean="0"/>
-              <a:t>14M.</a:t>
+              <a:t> 14M.</a:t>
             </a:r>
             <a:fld id="{9B55653B-1858-43BF-A49A-533C730B553F}" type="slidenum">
               <a:rPr lang="en-US" smtClean="0"/>
@@ -5621,11 +5605,7 @@
             </a:r>
             <a:r>
               <a:rPr lang="en-US" dirty="0" smtClean="0"/>
-              <a:t> </a:t>
-            </a:r>
-            <a:r>
-              <a:rPr lang="en-US" dirty="0" smtClean="0"/>
-              <a:t>14M.</a:t>
+              <a:t> 14M.</a:t>
             </a:r>
             <a:fld id="{4E62291C-8AD8-4AE0-8F6D-A8437E91FB33}" type="slidenum">
               <a:rPr lang="en-US" smtClean="0"/>
@@ -5833,11 +5813,7 @@
             </a:r>
             <a:r>
               <a:rPr lang="en-US" dirty="0" smtClean="0"/>
-              <a:t> </a:t>
-            </a:r>
-            <a:r>
-              <a:rPr lang="en-US" dirty="0" smtClean="0"/>
-              <a:t>14M.</a:t>
+              <a:t> 14M.</a:t>
             </a:r>
             <a:fld id="{7886A709-CED2-48A3-8616-B2655C008ECB}" type="slidenum">
               <a:rPr lang="en-US" smtClean="0"/>
@@ -5933,22 +5909,7 @@
                 <a:uFillTx/>
                 <a:latin typeface="Comic Sans MS" pitchFamily="66" charset="0"/>
               </a:rPr>
-              <a:t>Albert R Meyer           </a:t>
-            </a:r>
-            <a:r>
-              <a:rPr kumimoji="0" lang="en-US" sz="1200" b="0" i="0" u="none" strike="noStrike" kern="1200" cap="none" spc="0" normalizeH="0" baseline="0" noProof="0" dirty="0" smtClean="0">
-                <a:ln>
-                  <a:noFill/>
-                </a:ln>
-                <a:solidFill>
-                  <a:schemeClr val="tx1"/>
-                </a:solidFill>
-                <a:effectLst/>
-                <a:uLnTx/>
-                <a:uFillTx/>
-                <a:latin typeface="Comic Sans MS" pitchFamily="66" charset="0"/>
-              </a:rPr>
-              <a:t>December 5, 2011</a:t>
+              <a:t>Albert R Meyer           December 5, 2011</a:t>
             </a:r>
             <a:endParaRPr kumimoji="0" lang="en-US" sz="1200" b="0" i="0" u="none" strike="noStrike" kern="1200" cap="none" spc="0" normalizeH="0" baseline="0" noProof="0" dirty="0">
               <a:ln>
@@ -6412,11 +6373,7 @@
             </a:r>
             <a:r>
               <a:rPr lang="en-US" dirty="0" smtClean="0"/>
-              <a:t> </a:t>
-            </a:r>
-            <a:r>
-              <a:rPr lang="en-US" dirty="0" smtClean="0"/>
-              <a:t>14M.</a:t>
+              <a:t> 14M.</a:t>
             </a:r>
             <a:fld id="{E4635AA4-CD52-4E2F-88C8-055AD69B0D4E}" type="slidenum">
               <a:rPr lang="en-US" smtClean="0"/>
@@ -6727,7 +6684,7 @@
           <a:graphicData uri="http://schemas.openxmlformats.org/presentationml/2006/ole">
             <mc:AlternateContent xmlns:mc="http://schemas.openxmlformats.org/markup-compatibility/2006">
               <mc:Choice xmlns:v="urn:schemas-microsoft-com:vml" Requires="v">
-                <p:oleObj spid="_x0000_s580616" name="Equation" r:id="rId4" imgW="914400" imgH="220320" progId="Equation.DSMT4">
+                <p:oleObj spid="_x0000_s580621" name="Equation" r:id="rId4" imgW="914400" imgH="220320" progId="Equation.DSMT4">
                   <p:embed/>
                 </p:oleObj>
               </mc:Choice>
@@ -6900,11 +6857,7 @@
             </a:r>
             <a:r>
               <a:rPr lang="en-US" dirty="0" smtClean="0"/>
-              <a:t> </a:t>
-            </a:r>
-            <a:r>
-              <a:rPr lang="en-US" dirty="0" smtClean="0"/>
-              <a:t>14M.</a:t>
+              <a:t> 14M.</a:t>
             </a:r>
             <a:fld id="{7886A709-CED2-48A3-8616-B2655C008ECB}" type="slidenum">
               <a:rPr lang="en-US" smtClean="0"/>
@@ -6933,7 +6886,7 @@
           <a:graphicData uri="http://schemas.openxmlformats.org/presentationml/2006/ole">
             <mc:AlternateContent xmlns:mc="http://schemas.openxmlformats.org/markup-compatibility/2006">
               <mc:Choice xmlns:v="urn:schemas-microsoft-com:vml" Requires="v">
-                <p:oleObj spid="_x0000_s580617" name="Equation" r:id="rId6" imgW="1447560" imgH="482400" progId="Equation.DSMT4">
+                <p:oleObj spid="_x0000_s580622" name="Equation" r:id="rId6" imgW="1447560" imgH="482400" progId="Equation.DSMT4">
                   <p:embed/>
                 </p:oleObj>
               </mc:Choice>
@@ -7125,11 +7078,7 @@
             </a:r>
             <a:r>
               <a:rPr lang="en-US" dirty="0" smtClean="0"/>
-              <a:t> </a:t>
-            </a:r>
-            <a:r>
-              <a:rPr lang="en-US" dirty="0" smtClean="0"/>
-              <a:t>14M.</a:t>
+              <a:t> 14M.</a:t>
             </a:r>
             <a:fld id="{601D9D26-416F-483A-A5D6-37381C6E500B}" type="slidenum">
               <a:rPr lang="en-US" smtClean="0"/>
@@ -7282,11 +7231,7 @@
             </a:r>
             <a:r>
               <a:rPr lang="en-US" dirty="0" smtClean="0"/>
-              <a:t> </a:t>
-            </a:r>
-            <a:r>
-              <a:rPr lang="en-US" dirty="0" smtClean="0"/>
-              <a:t>14M.</a:t>
+              <a:t> 14M.</a:t>
             </a:r>
             <a:fld id="{B48ABEAC-C0A2-414D-A2EC-7337A3B2DB53}" type="slidenum">
               <a:rPr lang="en-US" smtClean="0"/>
@@ -7492,7 +7437,7 @@
           <a:graphicData uri="http://schemas.openxmlformats.org/presentationml/2006/ole">
             <mc:AlternateContent xmlns:mc="http://schemas.openxmlformats.org/markup-compatibility/2006">
               <mc:Choice xmlns:v="urn:schemas-microsoft-com:vml" Requires="v">
-                <p:oleObj spid="_x0000_s5126" name="Equation" r:id="rId4" imgW="190440" imgH="431640" progId="Equation.DSMT4">
+                <p:oleObj spid="_x0000_s5129" name="Equation" r:id="rId4" imgW="190440" imgH="431640" progId="Equation.DSMT4">
                   <p:embed/>
                 </p:oleObj>
               </mc:Choice>
@@ -7776,11 +7721,7 @@
             </a:r>
             <a:r>
               <a:rPr lang="en-US" dirty="0" smtClean="0"/>
-              <a:t> </a:t>
-            </a:r>
-            <a:r>
-              <a:rPr lang="en-US" dirty="0" smtClean="0"/>
-              <a:t>14M.</a:t>
+              <a:t> 14M.</a:t>
             </a:r>
             <a:fld id="{D23F9710-1A5A-4DD7-AAD4-90010A12B4AF}" type="slidenum">
               <a:rPr lang="en-US" smtClean="0"/>
@@ -8211,11 +8152,7 @@
             </a:r>
             <a:r>
               <a:rPr lang="en-US" dirty="0" smtClean="0"/>
-              <a:t> </a:t>
-            </a:r>
-            <a:r>
-              <a:rPr lang="en-US" dirty="0" smtClean="0"/>
-              <a:t>14M.</a:t>
+              <a:t> 14M.</a:t>
             </a:r>
             <a:fld id="{D23F9710-1A5A-4DD7-AAD4-90010A12B4AF}" type="slidenum">
               <a:rPr lang="en-US" smtClean="0"/>
@@ -8606,11 +8543,7 @@
             </a:r>
             <a:r>
               <a:rPr lang="en-US" dirty="0" smtClean="0"/>
-              <a:t> </a:t>
-            </a:r>
-            <a:r>
-              <a:rPr lang="en-US" dirty="0" smtClean="0"/>
-              <a:t>14M.</a:t>
+              <a:t> 14M.</a:t>
             </a:r>
             <a:fld id="{46C5BC43-4CC7-4EEC-A2B6-2433DE61198C}" type="slidenum">
               <a:rPr lang="en-US" smtClean="0"/>
@@ -8738,7 +8671,7 @@
           <a:graphicData uri="http://schemas.openxmlformats.org/presentationml/2006/ole">
             <mc:AlternateContent xmlns:mc="http://schemas.openxmlformats.org/markup-compatibility/2006">
               <mc:Choice xmlns:v="urn:schemas-microsoft-com:vml" Requires="v">
-                <p:oleObj spid="_x0000_s6150" name="Equation" r:id="rId4" imgW="1638000" imgH="507960" progId="Equation.DSMT4">
+                <p:oleObj spid="_x0000_s6153" name="Equation" r:id="rId4" imgW="1638000" imgH="507960" progId="Equation.DSMT4">
                   <p:embed/>
                 </p:oleObj>
               </mc:Choice>
@@ -8968,11 +8901,7 @@
             </a:r>
             <a:r>
               <a:rPr lang="en-US" dirty="0" smtClean="0"/>
-              <a:t> </a:t>
-            </a:r>
-            <a:r>
-              <a:rPr lang="en-US" dirty="0" smtClean="0"/>
-              <a:t>14M.</a:t>
+              <a:t> 14M.</a:t>
             </a:r>
             <a:fld id="{D6314249-D27F-4E10-9233-4726DA19EA68}" type="slidenum">
               <a:rPr lang="en-US" smtClean="0"/>
@@ -9520,13 +9449,7 @@
               <a:rPr lang="en-US" dirty="0" smtClean="0">
                 <a:latin typeface="+mj-lt"/>
               </a:rPr>
-              <a:t> </a:t>
-            </a:r>
-            <a:r>
-              <a:rPr lang="en-US" dirty="0" smtClean="0">
-                <a:latin typeface="+mj-lt"/>
-              </a:rPr>
-              <a:t>14M.</a:t>
+              <a:t> 14M.</a:t>
             </a:r>
             <a:fld id="{E30C1D59-262D-4F8F-B8EA-654BF725DE37}" type="slidenum">
               <a:rPr lang="en-US" smtClean="0">
@@ -10292,11 +10215,7 @@
             </a:r>
             <a:r>
               <a:rPr lang="en-US" dirty="0" smtClean="0"/>
-              <a:t> </a:t>
-            </a:r>
-            <a:r>
-              <a:rPr lang="en-US" dirty="0" smtClean="0"/>
-              <a:t>14M.</a:t>
+              <a:t> 14M.</a:t>
             </a:r>
             <a:fld id="{5D7D57D3-C431-464B-8EDB-FA5824302EDB}" type="slidenum">
               <a:rPr lang="en-US" smtClean="0"/>
@@ -10803,11 +10722,7 @@
             </a:r>
             <a:r>
               <a:rPr lang="en-US" dirty="0" smtClean="0"/>
-              <a:t> </a:t>
-            </a:r>
-            <a:r>
-              <a:rPr lang="en-US" dirty="0" smtClean="0"/>
-              <a:t>14M.</a:t>
+              <a:t> 14M.</a:t>
             </a:r>
             <a:fld id="{4BEEAA87-0C16-438F-8FC8-D5EDAE475F35}" type="slidenum">
               <a:rPr lang="en-US" smtClean="0"/>
@@ -11524,11 +11439,7 @@
             </a:r>
             <a:r>
               <a:rPr lang="en-US" dirty="0" smtClean="0"/>
-              <a:t> </a:t>
-            </a:r>
-            <a:r>
-              <a:rPr lang="en-US" dirty="0" smtClean="0"/>
-              <a:t>14M.</a:t>
+              <a:t> 14M.</a:t>
             </a:r>
             <a:fld id="{29635E03-FCDF-4257-96EB-6C762F5E2419}" type="slidenum">
               <a:rPr lang="en-US" smtClean="0"/>
@@ -12258,11 +12169,7 @@
             </a:r>
             <a:r>
               <a:rPr lang="en-US" dirty="0" smtClean="0"/>
-              <a:t> </a:t>
-            </a:r>
-            <a:r>
-              <a:rPr lang="en-US" dirty="0" smtClean="0"/>
-              <a:t>14M.</a:t>
+              <a:t> 14M.</a:t>
             </a:r>
             <a:fld id="{4BEEAA87-0C16-438F-8FC8-D5EDAE475F35}" type="slidenum">
               <a:rPr lang="en-US" smtClean="0"/>
@@ -12814,11 +12721,7 @@
             </a:r>
             <a:r>
               <a:rPr lang="en-US" dirty="0" smtClean="0"/>
-              <a:t> </a:t>
-            </a:r>
-            <a:r>
-              <a:rPr lang="en-US" dirty="0" smtClean="0"/>
-              <a:t>14M.</a:t>
+              <a:t> 14M.</a:t>
             </a:r>
             <a:fld id="{95F672D9-7FDA-4DF5-84B2-B60196FF4FEA}" type="slidenum">
               <a:rPr lang="en-US" smtClean="0"/>
@@ -13370,11 +13273,7 @@
             </a:r>
             <a:r>
               <a:rPr lang="en-US" dirty="0" smtClean="0"/>
-              <a:t> </a:t>
-            </a:r>
-            <a:r>
-              <a:rPr lang="en-US" dirty="0" smtClean="0"/>
-              <a:t>14M.</a:t>
+              <a:t> 14M.</a:t>
             </a:r>
             <a:fld id="{39196791-36AF-407D-9527-253971E27E13}" type="slidenum">
               <a:rPr lang="en-US" smtClean="0"/>
@@ -13576,7 +13475,7 @@
           <a:graphicData uri="http://schemas.openxmlformats.org/presentationml/2006/ole">
             <mc:AlternateContent xmlns:mc="http://schemas.openxmlformats.org/markup-compatibility/2006">
               <mc:Choice xmlns:v="urn:schemas-microsoft-com:vml" Requires="v">
-                <p:oleObj spid="_x0000_s484358" name="Equation" r:id="rId4" imgW="2133600" imgH="533400" progId="Equation.DSMT4">
+                <p:oleObj spid="_x0000_s484361" name="Equation" r:id="rId4" imgW="2133600" imgH="533400" progId="Equation.DSMT4">
                   <p:embed/>
                 </p:oleObj>
               </mc:Choice>
@@ -13949,11 +13848,7 @@
             </a:r>
             <a:r>
               <a:rPr lang="en-US" dirty="0" smtClean="0"/>
-              <a:t> </a:t>
-            </a:r>
-            <a:r>
-              <a:rPr lang="en-US" dirty="0" smtClean="0"/>
-              <a:t>14M.</a:t>
+              <a:t> 14M.</a:t>
             </a:r>
             <a:fld id="{49480264-560C-4B6D-AA11-2CFC3B5E1642}" type="slidenum">
               <a:rPr lang="en-US" smtClean="0"/>
@@ -14714,11 +14609,7 @@
             </a:r>
             <a:r>
               <a:rPr lang="en-US" dirty="0" smtClean="0"/>
-              <a:t> </a:t>
-            </a:r>
-            <a:r>
-              <a:rPr lang="en-US" dirty="0" smtClean="0"/>
-              <a:t>14M.</a:t>
+              <a:t> 14M.</a:t>
             </a:r>
             <a:fld id="{8D1CEAE9-5C17-48A5-8273-F5BB2E618A83}" type="slidenum">
               <a:rPr lang="en-US" smtClean="0"/>
@@ -15444,11 +15335,7 @@
             </a:r>
             <a:r>
               <a:rPr lang="en-US" dirty="0" smtClean="0"/>
-              <a:t> </a:t>
-            </a:r>
-            <a:r>
-              <a:rPr lang="en-US" dirty="0" smtClean="0"/>
-              <a:t>14M.</a:t>
+              <a:t> 14M.</a:t>
             </a:r>
             <a:fld id="{8D1CEAE9-5C17-48A5-8273-F5BB2E618A83}" type="slidenum">
               <a:rPr lang="en-US" smtClean="0"/>
@@ -16163,11 +16050,7 @@
             </a:r>
             <a:r>
               <a:rPr lang="en-US" dirty="0" smtClean="0"/>
-              <a:t> </a:t>
-            </a:r>
-            <a:r>
-              <a:rPr lang="en-US" dirty="0" smtClean="0"/>
-              <a:t>14M.</a:t>
+              <a:t> 14M.</a:t>
             </a:r>
             <a:fld id="{590A2166-0018-4978-87FF-4F4CBF7BDDD9}" type="slidenum">
               <a:rPr lang="en-US" smtClean="0"/>
@@ -17027,11 +16910,7 @@
             </a:r>
             <a:r>
               <a:rPr lang="en-US" dirty="0" smtClean="0"/>
-              <a:t> </a:t>
-            </a:r>
-            <a:r>
-              <a:rPr lang="en-US" dirty="0" smtClean="0"/>
-              <a:t>14M.</a:t>
+              <a:t> 14M.</a:t>
             </a:r>
             <a:fld id="{8DD91466-0C9A-4B09-A15B-A12F4B3C9D68}" type="slidenum">
               <a:rPr lang="en-US" smtClean="0"/>
@@ -17244,11 +17123,7 @@
             </a:r>
             <a:r>
               <a:rPr lang="en-US" dirty="0" smtClean="0"/>
-              <a:t> </a:t>
-            </a:r>
-            <a:r>
-              <a:rPr lang="en-US" dirty="0" smtClean="0"/>
-              <a:t>14M.</a:t>
+              <a:t> 14M.</a:t>
             </a:r>
             <a:fld id="{5502BB3B-0EEA-453B-BE55-E4452FE5D144}" type="slidenum">
               <a:rPr lang="en-US" smtClean="0"/>
@@ -17450,11 +17325,7 @@
             </a:r>
             <a:r>
               <a:rPr lang="en-US" dirty="0" smtClean="0"/>
-              <a:t> </a:t>
-            </a:r>
-            <a:r>
-              <a:rPr lang="en-US" dirty="0" smtClean="0"/>
-              <a:t>14M.</a:t>
+              <a:t> 14M.</a:t>
             </a:r>
             <a:fld id="{DEDCF3E0-95E5-4B40-9A75-5FDE935C9264}" type="slidenum">
               <a:rPr lang="en-US" smtClean="0"/>
@@ -18253,11 +18124,7 @@
             </a:r>
             <a:r>
               <a:rPr lang="en-US" dirty="0" smtClean="0"/>
-              <a:t> </a:t>
-            </a:r>
-            <a:r>
-              <a:rPr lang="en-US" dirty="0" smtClean="0"/>
-              <a:t>14M.</a:t>
+              <a:t> 14M.</a:t>
             </a:r>
             <a:fld id="{7E781BB2-0009-4685-941F-B9830CAD66CE}" type="slidenum">
               <a:rPr lang="en-US" smtClean="0"/>
@@ -18397,11 +18264,7 @@
             </a:r>
             <a:r>
               <a:rPr lang="en-US" dirty="0" smtClean="0"/>
-              <a:t> </a:t>
-            </a:r>
-            <a:r>
-              <a:rPr lang="en-US" dirty="0" smtClean="0"/>
-              <a:t>14M.</a:t>
+              <a:t> 14M.</a:t>
             </a:r>
             <a:fld id="{DEDCF3E0-95E5-4B40-9A75-5FDE935C9264}" type="slidenum">
               <a:rPr lang="en-US" smtClean="0"/>
@@ -18694,7 +18557,7 @@
           <a:graphicData uri="http://schemas.openxmlformats.org/presentationml/2006/ole">
             <mc:AlternateContent xmlns:mc="http://schemas.openxmlformats.org/markup-compatibility/2006">
               <mc:Choice xmlns:v="urn:schemas-microsoft-com:vml" Requires="v">
-                <p:oleObj spid="_x0000_s648199" name="Equation" r:id="rId4" imgW="1790700" imgH="469900" progId="Equation.DSMT4">
+                <p:oleObj spid="_x0000_s648202" name="Equation" r:id="rId4" imgW="1790700" imgH="469900" progId="Equation.DSMT4">
                   <p:embed/>
                 </p:oleObj>
               </mc:Choice>
@@ -18884,11 +18747,7 @@
             </a:r>
             <a:r>
               <a:rPr lang="en-US" dirty="0" smtClean="0"/>
-              <a:t> </a:t>
-            </a:r>
-            <a:r>
-              <a:rPr lang="en-US" dirty="0" smtClean="0"/>
-              <a:t>14M.</a:t>
+              <a:t> 14M.</a:t>
             </a:r>
             <a:fld id="{DEDCF3E0-95E5-4B40-9A75-5FDE935C9264}" type="slidenum">
               <a:rPr lang="en-US" smtClean="0"/>
@@ -19181,7 +19040,7 @@
           <a:graphicData uri="http://schemas.openxmlformats.org/presentationml/2006/ole">
             <mc:AlternateContent xmlns:mc="http://schemas.openxmlformats.org/markup-compatibility/2006">
               <mc:Choice xmlns:v="urn:schemas-microsoft-com:vml" Requires="v">
-                <p:oleObj spid="_x0000_s677894" name="Equation" r:id="rId4" imgW="660400" imgH="596900" progId="Equation.DSMT4">
+                <p:oleObj spid="_x0000_s677897" name="Equation" r:id="rId4" imgW="660400" imgH="596900" progId="Equation.DSMT4">
                   <p:embed/>
                 </p:oleObj>
               </mc:Choice>
@@ -19294,11 +19153,7 @@
             </a:r>
             <a:r>
               <a:rPr lang="en-US" dirty="0" smtClean="0"/>
-              <a:t> </a:t>
-            </a:r>
-            <a:r>
-              <a:rPr lang="en-US" dirty="0" smtClean="0"/>
-              <a:t>14M.</a:t>
+              <a:t> 14M.</a:t>
             </a:r>
             <a:fld id="{DEDCF3E0-95E5-4B40-9A75-5FDE935C9264}" type="slidenum">
               <a:rPr lang="en-US" smtClean="0"/>
@@ -19591,7 +19446,7 @@
           <a:graphicData uri="http://schemas.openxmlformats.org/presentationml/2006/ole">
             <mc:AlternateContent xmlns:mc="http://schemas.openxmlformats.org/markup-compatibility/2006">
               <mc:Choice xmlns:v="urn:schemas-microsoft-com:vml" Requires="v">
-                <p:oleObj spid="_x0000_s651272" name="Equation" r:id="rId4" imgW="660400" imgH="596900" progId="Equation.DSMT4">
+                <p:oleObj spid="_x0000_s651277" name="Equation" r:id="rId4" imgW="660400" imgH="596900" progId="Equation.DSMT4">
                   <p:embed/>
                 </p:oleObj>
               </mc:Choice>
@@ -19661,7 +19516,7 @@
           <a:graphicData uri="http://schemas.openxmlformats.org/presentationml/2006/ole">
             <mc:AlternateContent xmlns:mc="http://schemas.openxmlformats.org/markup-compatibility/2006">
               <mc:Choice xmlns:v="urn:schemas-microsoft-com:vml" Requires="v">
-                <p:oleObj spid="_x0000_s651273" name="Equation" r:id="rId6" imgW="977900" imgH="469900" progId="Equation.DSMT4">
+                <p:oleObj spid="_x0000_s651278" name="Equation" r:id="rId6" imgW="977900" imgH="469900" progId="Equation.DSMT4">
                   <p:embed/>
                 </p:oleObj>
               </mc:Choice>
@@ -19931,11 +19786,7 @@
             </a:r>
             <a:r>
               <a:rPr lang="en-US" dirty="0" smtClean="0"/>
-              <a:t> </a:t>
-            </a:r>
-            <a:r>
-              <a:rPr lang="en-US" dirty="0" smtClean="0"/>
-              <a:t>14M.</a:t>
+              <a:t> 14M.</a:t>
             </a:r>
             <a:fld id="{DEDCF3E0-95E5-4B40-9A75-5FDE935C9264}" type="slidenum">
               <a:rPr lang="en-US" smtClean="0"/>
@@ -20222,7 +20073,7 @@
           <a:graphicData uri="http://schemas.openxmlformats.org/presentationml/2006/ole">
             <mc:AlternateContent xmlns:mc="http://schemas.openxmlformats.org/markup-compatibility/2006">
               <mc:Choice xmlns:v="urn:schemas-microsoft-com:vml" Requires="v">
-                <p:oleObj spid="_x0000_s100358" name="Equation" r:id="rId4" imgW="711200" imgH="393700" progId="Equation.DSMT4">
+                <p:oleObj spid="_x0000_s100361" name="Equation" r:id="rId4" imgW="711200" imgH="393700" progId="Equation.DSMT4">
                   <p:embed/>
                 </p:oleObj>
               </mc:Choice>
@@ -20411,11 +20262,7 @@
             </a:r>
             <a:r>
               <a:rPr lang="en-US" dirty="0" smtClean="0"/>
-              <a:t> </a:t>
-            </a:r>
-            <a:r>
-              <a:rPr lang="en-US" dirty="0" smtClean="0"/>
-              <a:t>14M.</a:t>
+              <a:t> 14M.</a:t>
             </a:r>
             <a:fld id="{DEDCF3E0-95E5-4B40-9A75-5FDE935C9264}" type="slidenum">
               <a:rPr lang="en-US" smtClean="0"/>
@@ -20698,7 +20545,7 @@
           <a:graphicData uri="http://schemas.openxmlformats.org/presentationml/2006/ole">
             <mc:AlternateContent xmlns:mc="http://schemas.openxmlformats.org/markup-compatibility/2006">
               <mc:Choice xmlns:v="urn:schemas-microsoft-com:vml" Requires="v">
-                <p:oleObj spid="_x0000_s122886" name="Equation" r:id="rId4" imgW="901700" imgH="533400" progId="Equation.DSMT4">
+                <p:oleObj spid="_x0000_s122889" name="Equation" r:id="rId4" imgW="901700" imgH="533400" progId="Equation.DSMT4">
                   <p:embed/>
                 </p:oleObj>
               </mc:Choice>
@@ -20887,11 +20734,7 @@
             </a:r>
             <a:r>
               <a:rPr lang="en-US" dirty="0" smtClean="0"/>
-              <a:t> </a:t>
-            </a:r>
-            <a:r>
-              <a:rPr lang="en-US" dirty="0" smtClean="0"/>
-              <a:t>14M.</a:t>
+              <a:t> 14M.</a:t>
             </a:r>
             <a:fld id="{DEDCF3E0-95E5-4B40-9A75-5FDE935C9264}" type="slidenum">
               <a:rPr lang="en-US" smtClean="0"/>
@@ -21213,11 +21056,7 @@
             </a:r>
             <a:r>
               <a:rPr lang="en-US" dirty="0" smtClean="0"/>
-              <a:t> </a:t>
-            </a:r>
-            <a:r>
-              <a:rPr lang="en-US" dirty="0" smtClean="0"/>
-              <a:t>14M.</a:t>
+              <a:t> 14M.</a:t>
             </a:r>
             <a:fld id="{96B43620-50E9-4AF8-A2CB-DB1E00EE695D}" type="slidenum">
               <a:rPr lang="en-US" smtClean="0"/>
@@ -21406,7 +21245,7 @@
           <a:graphicData uri="http://schemas.openxmlformats.org/presentationml/2006/ole">
             <mc:AlternateContent xmlns:mc="http://schemas.openxmlformats.org/markup-compatibility/2006">
               <mc:Choice xmlns:v="urn:schemas-microsoft-com:vml" Requires="v">
-                <p:oleObj spid="_x0000_s104454" name="Equation" r:id="rId4" imgW="1676400" imgH="533400" progId="Equation.DSMT4">
+                <p:oleObj spid="_x0000_s104457" name="Equation" r:id="rId4" imgW="1676400" imgH="533400" progId="Equation.DSMT4">
                   <p:embed/>
                 </p:oleObj>
               </mc:Choice>
@@ -21711,11 +21550,7 @@
             </a:r>
             <a:r>
               <a:rPr lang="en-US" dirty="0" smtClean="0"/>
-              <a:t> </a:t>
-            </a:r>
-            <a:r>
-              <a:rPr lang="en-US" dirty="0" smtClean="0"/>
-              <a:t>14M.</a:t>
+              <a:t> 14M.</a:t>
             </a:r>
             <a:fld id="{96B43620-50E9-4AF8-A2CB-DB1E00EE695D}" type="slidenum">
               <a:rPr lang="en-US" smtClean="0"/>
@@ -22141,11 +21976,7 @@
             </a:r>
             <a:r>
               <a:rPr lang="en-US" dirty="0" smtClean="0"/>
-              <a:t> </a:t>
-            </a:r>
-            <a:r>
-              <a:rPr lang="en-US" dirty="0" smtClean="0"/>
-              <a:t>14M.</a:t>
+              <a:t> 14M.</a:t>
             </a:r>
             <a:fld id="{C000224B-2332-4750-9253-37D5821B63F0}" type="slidenum">
               <a:rPr lang="en-US" smtClean="0"/>
@@ -22337,7 +22168,7 @@
           <a:graphicData uri="http://schemas.openxmlformats.org/presentationml/2006/ole">
             <mc:AlternateContent xmlns:mc="http://schemas.openxmlformats.org/markup-compatibility/2006">
               <mc:Choice xmlns:v="urn:schemas-microsoft-com:vml" Requires="v">
-                <p:oleObj spid="_x0000_s79878" name="Equation" r:id="rId4" imgW="164880" imgH="393480" progId="Equation.DSMT4">
+                <p:oleObj spid="_x0000_s79881" name="Equation" r:id="rId4" imgW="164880" imgH="393480" progId="Equation.DSMT4">
                   <p:embed/>
                 </p:oleObj>
               </mc:Choice>
@@ -22746,11 +22577,7 @@
             </a:r>
             <a:r>
               <a:rPr lang="en-US" dirty="0" smtClean="0"/>
-              <a:t> </a:t>
-            </a:r>
-            <a:r>
-              <a:rPr lang="en-US" dirty="0" smtClean="0"/>
-              <a:t>14M.</a:t>
+              <a:t> 14M.</a:t>
             </a:r>
             <a:fld id="{F2801238-F1E7-4FD8-BA50-E337AFF1C7D6}" type="slidenum">
               <a:rPr lang="en-US" smtClean="0"/>
@@ -23437,11 +23264,7 @@
             </a:r>
             <a:r>
               <a:rPr lang="en-US" dirty="0" smtClean="0"/>
-              <a:t> </a:t>
-            </a:r>
-            <a:r>
-              <a:rPr lang="en-US" dirty="0" smtClean="0"/>
-              <a:t>14M.</a:t>
+              <a:t> 14M.</a:t>
             </a:r>
             <a:fld id="{8C735B2F-117E-467F-AA86-C8CA26EAB274}" type="slidenum">
               <a:rPr lang="en-US" smtClean="0"/>
@@ -24215,14 +24038,7 @@
                 <a:latin typeface="Comic Sans MS"/>
                 <a:cs typeface="Comic Sans MS"/>
               </a:rPr>
-              <a:t> </a:t>
-            </a:r>
-            <a:r>
-              <a:rPr lang="en-US" sz="1200" dirty="0" smtClean="0">
-                <a:latin typeface="Comic Sans MS"/>
-                <a:cs typeface="Comic Sans MS"/>
-              </a:rPr>
-              <a:t>14M.</a:t>
+              <a:t> 14M.</a:t>
             </a:r>
             <a:fld id="{679D5B46-281B-48C5-ADB5-CFE0495CD191}" type="slidenum">
               <a:rPr lang="en-US" sz="1200" smtClean="0">
@@ -24739,14 +24555,7 @@
                 <a:latin typeface="Comic Sans MS"/>
                 <a:cs typeface="Comic Sans MS"/>
               </a:rPr>
-              <a:t> </a:t>
-            </a:r>
-            <a:r>
-              <a:rPr lang="en-US" sz="1200" dirty="0" smtClean="0">
-                <a:latin typeface="Comic Sans MS"/>
-                <a:cs typeface="Comic Sans MS"/>
-              </a:rPr>
-              <a:t>14M.</a:t>
+              <a:t> 14M.</a:t>
             </a:r>
             <a:fld id="{679D5B46-281B-48C5-ADB5-CFE0495CD191}" type="slidenum">
               <a:rPr lang="en-US" sz="1200" smtClean="0">
@@ -25377,14 +25186,7 @@
                 <a:latin typeface="Comic Sans MS"/>
                 <a:cs typeface="Comic Sans MS"/>
               </a:rPr>
-              <a:t> </a:t>
-            </a:r>
-            <a:r>
-              <a:rPr lang="en-US" sz="1200" dirty="0" smtClean="0">
-                <a:latin typeface="Comic Sans MS"/>
-                <a:cs typeface="Comic Sans MS"/>
-              </a:rPr>
-              <a:t>14M.</a:t>
+              <a:t> 14M.</a:t>
             </a:r>
             <a:fld id="{679D5B46-281B-48C5-ADB5-CFE0495CD191}" type="slidenum">
               <a:rPr lang="en-US" sz="1200" smtClean="0">
@@ -25803,14 +25605,7 @@
                 <a:latin typeface="Comic Sans MS"/>
                 <a:cs typeface="Comic Sans MS"/>
               </a:rPr>
-              <a:t> </a:t>
-            </a:r>
-            <a:r>
-              <a:rPr lang="en-US" sz="1200" dirty="0" smtClean="0">
-                <a:latin typeface="Comic Sans MS"/>
-                <a:cs typeface="Comic Sans MS"/>
-              </a:rPr>
-              <a:t>14M.</a:t>
+              <a:t> 14M.</a:t>
             </a:r>
             <a:fld id="{679D5B46-281B-48C5-ADB5-CFE0495CD191}" type="slidenum">
               <a:rPr lang="en-US" sz="1200" smtClean="0">
@@ -26027,11 +25822,7 @@
             </a:r>
             <a:r>
               <a:rPr lang="en-US" dirty="0" smtClean="0"/>
-              <a:t> </a:t>
-            </a:r>
-            <a:r>
-              <a:rPr lang="en-US" dirty="0" smtClean="0"/>
-              <a:t>14M.</a:t>
+              <a:t> 14M.</a:t>
             </a:r>
             <a:fld id="{CE1FEF93-960A-4432-A981-01A75AA852BE}" type="slidenum">
               <a:rPr lang="en-US" smtClean="0"/>
@@ -26122,7 +25913,18 @@
   <p:clrMapOvr>
     <a:masterClrMapping/>
   </p:clrMapOvr>
-  <p:transition xmlns:p14="http://schemas.microsoft.com/office/powerpoint/2010/main"/>
+  <mc:AlternateContent xmlns:mc="http://schemas.openxmlformats.org/markup-compatibility/2006">
+    <mc:Choice xmlns:p14="http://schemas.microsoft.com/office/powerpoint/2010/main" Requires="p14">
+      <p:transition spd="med" p14:dur="700">
+        <p:fade thruBlk="1"/>
+      </p:transition>
+    </mc:Choice>
+    <mc:Fallback>
+      <p:transition xmlns:p14="http://schemas.microsoft.com/office/powerpoint/2010/main" spd="med">
+        <p:fade thruBlk="1"/>
+      </p:transition>
+    </mc:Fallback>
+  </mc:AlternateContent>
   <p:timing>
     <p:tnLst>
       <p:par>
@@ -26174,11 +25976,7 @@
             </a:r>
             <a:r>
               <a:rPr lang="en-US" dirty="0" smtClean="0"/>
-              <a:t> </a:t>
-            </a:r>
-            <a:r>
-              <a:rPr lang="en-US" dirty="0" smtClean="0"/>
-              <a:t>14M.</a:t>
+              <a:t> 14M.</a:t>
             </a:r>
             <a:fld id="{DC9731CB-2F8A-470A-AADF-931B7CDAF7AD}" type="slidenum">
               <a:rPr lang="en-US" smtClean="0"/>
@@ -26379,7 +26177,7 @@
           <a:graphicData uri="http://schemas.openxmlformats.org/presentationml/2006/ole">
             <mc:AlternateContent xmlns:mc="http://schemas.openxmlformats.org/markup-compatibility/2006">
               <mc:Choice xmlns:v="urn:schemas-microsoft-com:vml" Requires="v">
-                <p:oleObj spid="_x0000_s1030" name="Equation" r:id="rId4" imgW="164880" imgH="419040" progId="Equation.DSMT4">
+                <p:oleObj spid="_x0000_s1033" name="Equation" r:id="rId4" imgW="164880" imgH="419040" progId="Equation.DSMT4">
                   <p:embed/>
                 </p:oleObj>
               </mc:Choice>
@@ -26721,11 +26519,7 @@
             </a:r>
             <a:r>
               <a:rPr lang="en-US" dirty="0" smtClean="0"/>
-              <a:t> </a:t>
-            </a:r>
-            <a:r>
-              <a:rPr lang="en-US" dirty="0" smtClean="0"/>
-              <a:t>14M.</a:t>
+              <a:t> 14M.</a:t>
             </a:r>
             <a:fld id="{DE5972EA-EB66-4458-A91F-67F065CCE3C5}" type="slidenum">
               <a:rPr lang="en-US" smtClean="0"/>
@@ -26880,7 +26674,7 @@
           <a:graphicData uri="http://schemas.openxmlformats.org/presentationml/2006/ole">
             <mc:AlternateContent xmlns:mc="http://schemas.openxmlformats.org/markup-compatibility/2006">
               <mc:Choice xmlns:v="urn:schemas-microsoft-com:vml" Requires="v">
-                <p:oleObj spid="_x0000_s2054" name="Equation" r:id="rId4" imgW="152280" imgH="419040" progId="Equation.DSMT4">
+                <p:oleObj spid="_x0000_s2057" name="Equation" r:id="rId4" imgW="152280" imgH="419040" progId="Equation.DSMT4">
                   <p:embed/>
                 </p:oleObj>
               </mc:Choice>
@@ -27182,11 +26976,7 @@
             </a:r>
             <a:r>
               <a:rPr lang="en-US" dirty="0" smtClean="0"/>
-              <a:t> </a:t>
-            </a:r>
-            <a:r>
-              <a:rPr lang="en-US" dirty="0" smtClean="0"/>
-              <a:t>14M.</a:t>
+              <a:t> 14M.</a:t>
             </a:r>
             <a:fld id="{C8E1B2AC-ADC5-4B51-80CC-A3F4D8DD7E35}" type="slidenum">
               <a:rPr lang="en-US" smtClean="0"/>
@@ -27320,7 +27110,7 @@
           <a:graphicData uri="http://schemas.openxmlformats.org/presentationml/2006/ole">
             <mc:AlternateContent xmlns:mc="http://schemas.openxmlformats.org/markup-compatibility/2006">
               <mc:Choice xmlns:v="urn:schemas-microsoft-com:vml" Requires="v">
-                <p:oleObj spid="_x0000_s3078" name="Equation" r:id="rId4" imgW="152280" imgH="419040" progId="Equation.DSMT4">
+                <p:oleObj spid="_x0000_s3081" name="Equation" r:id="rId4" imgW="152280" imgH="419040" progId="Equation.DSMT4">
                   <p:embed/>
                 </p:oleObj>
               </mc:Choice>
@@ -27945,11 +27735,7 @@
             </a:r>
             <a:r>
               <a:rPr lang="en-US" dirty="0" smtClean="0"/>
-              <a:t> </a:t>
-            </a:r>
-            <a:r>
-              <a:rPr lang="en-US" dirty="0" smtClean="0"/>
-              <a:t>14M.</a:t>
+              <a:t> 14M.</a:t>
             </a:r>
             <a:fld id="{7886A709-CED2-48A3-8616-B2655C008ECB}" type="slidenum">
               <a:rPr lang="en-US" smtClean="0"/>
@@ -28380,7 +28166,7 @@
           <a:graphicData uri="http://schemas.openxmlformats.org/presentationml/2006/ole">
             <mc:AlternateContent xmlns:mc="http://schemas.openxmlformats.org/markup-compatibility/2006">
               <mc:Choice xmlns:v="urn:schemas-microsoft-com:vml" Requires="v">
-                <p:oleObj spid="_x0000_s502790" name="Equation" r:id="rId4" imgW="914400" imgH="220320" progId="Equation.DSMT4">
+                <p:oleObj spid="_x0000_s502793" name="Equation" r:id="rId4" imgW="914400" imgH="220320" progId="Equation.DSMT4">
                   <p:embed/>
                 </p:oleObj>
               </mc:Choice>
@@ -28553,11 +28339,7 @@
             </a:r>
             <a:r>
               <a:rPr lang="en-US" dirty="0" smtClean="0"/>
-              <a:t> </a:t>
-            </a:r>
-            <a:r>
-              <a:rPr lang="en-US" dirty="0" smtClean="0"/>
-              <a:t>14M.</a:t>
+              <a:t> 14M.</a:t>
             </a:r>
             <a:fld id="{7886A709-CED2-48A3-8616-B2655C008ECB}" type="slidenum">
               <a:rPr lang="en-US" smtClean="0"/>

</xml_diff>